<commit_message>
Final update for the day
</commit_message>
<xml_diff>
--- a/Project 1.pptx
+++ b/Project 1.pptx
@@ -27096,8 +27096,8 @@
         </p:blipFill>
         <p:spPr>
           <a:xfrm>
-            <a:off x="728601" y="1407791"/>
-            <a:ext cx="5672512" cy="4033142"/>
+            <a:off x="728601" y="1407790"/>
+            <a:ext cx="5672512" cy="4552323"/>
           </a:xfrm>
           <a:prstGeom prst="rect">
             <a:avLst/>

</xml_diff>